<commit_message>
Adding changes in CA for #6
</commit_message>
<xml_diff>
--- a/docs/SRS/SystemContextFigure.pptx
+++ b/docs/SRS/SystemContextFigure.pptx
@@ -104,6 +104,22 @@
       </a:defRPr>
     </a:lvl9pPr>
   </p:defaultTextStyle>
+  <p:extLst>
+    <p:ext uri="{EFAFB233-063F-42B5-8137-9DF3F51BA10A}">
+      <p15:sldGuideLst xmlns:p15="http://schemas.microsoft.com/office/powerpoint/2012/main">
+        <p15:guide id="1" orient="horz" pos="2160">
+          <p15:clr>
+            <a:srgbClr val="A4A3A4"/>
+          </p15:clr>
+        </p15:guide>
+        <p15:guide id="2" pos="2880">
+          <p15:clr>
+            <a:srgbClr val="A4A3A4"/>
+          </p15:clr>
+        </p15:guide>
+      </p15:sldGuideLst>
+    </p:ext>
+  </p:extLst>
 </p:presentation>
 </file>
 
@@ -145,7 +161,7 @@
           <a:lstStyle/>
           <a:p>
             <a:r>
-              <a:rPr lang="en-CA" smtClean="0"/>
+              <a:rPr lang="en-CA"/>
               <a:t>Click to edit Master title style</a:t>
             </a:r>
             <a:endParaRPr lang="en-US"/>
@@ -264,7 +280,7 @@
           </a:lstStyle>
           <a:p>
             <a:r>
-              <a:rPr lang="en-CA" smtClean="0"/>
+              <a:rPr lang="en-CA"/>
               <a:t>Click to edit Master subtitle style</a:t>
             </a:r>
             <a:endParaRPr lang="en-US"/>
@@ -288,7 +304,7 @@
           <a:p>
             <a:fld id="{779256A2-DE0C-7447-B687-786F38514E8C}" type="datetimeFigureOut">
               <a:rPr lang="en-US" smtClean="0"/>
-              <a:t>18-10-02</a:t>
+              <a:t>11/2/18</a:t>
             </a:fld>
             <a:endParaRPr lang="en-US"/>
           </a:p>
@@ -382,7 +398,7 @@
           <a:lstStyle/>
           <a:p>
             <a:r>
-              <a:rPr lang="en-CA" smtClean="0"/>
+              <a:rPr lang="en-CA"/>
               <a:t>Click to edit Master title style</a:t>
             </a:r>
             <a:endParaRPr lang="en-US"/>
@@ -406,35 +422,35 @@
           <a:p>
             <a:pPr lvl="0"/>
             <a:r>
-              <a:rPr lang="en-CA" smtClean="0"/>
+              <a:rPr lang="en-CA"/>
               <a:t>Click to edit Master text styles</a:t>
             </a:r>
           </a:p>
           <a:p>
             <a:pPr lvl="1"/>
             <a:r>
-              <a:rPr lang="en-CA" smtClean="0"/>
+              <a:rPr lang="en-CA"/>
               <a:t>Second level</a:t>
             </a:r>
           </a:p>
           <a:p>
             <a:pPr lvl="2"/>
             <a:r>
-              <a:rPr lang="en-CA" smtClean="0"/>
+              <a:rPr lang="en-CA"/>
               <a:t>Third level</a:t>
             </a:r>
           </a:p>
           <a:p>
             <a:pPr lvl="3"/>
             <a:r>
-              <a:rPr lang="en-CA" smtClean="0"/>
+              <a:rPr lang="en-CA"/>
               <a:t>Fourth level</a:t>
             </a:r>
           </a:p>
           <a:p>
             <a:pPr lvl="4"/>
             <a:r>
-              <a:rPr lang="en-CA" smtClean="0"/>
+              <a:rPr lang="en-CA"/>
               <a:t>Fifth level</a:t>
             </a:r>
             <a:endParaRPr lang="en-US"/>
@@ -458,7 +474,7 @@
           <a:p>
             <a:fld id="{779256A2-DE0C-7447-B687-786F38514E8C}" type="datetimeFigureOut">
               <a:rPr lang="en-US" smtClean="0"/>
-              <a:t>18-10-02</a:t>
+              <a:t>11/2/18</a:t>
             </a:fld>
             <a:endParaRPr lang="en-US"/>
           </a:p>
@@ -557,7 +573,7 @@
           <a:lstStyle/>
           <a:p>
             <a:r>
-              <a:rPr lang="en-CA" smtClean="0"/>
+              <a:rPr lang="en-CA"/>
               <a:t>Click to edit Master title style</a:t>
             </a:r>
             <a:endParaRPr lang="en-US"/>
@@ -586,35 +602,35 @@
           <a:p>
             <a:pPr lvl="0"/>
             <a:r>
-              <a:rPr lang="en-CA" smtClean="0"/>
+              <a:rPr lang="en-CA"/>
               <a:t>Click to edit Master text styles</a:t>
             </a:r>
           </a:p>
           <a:p>
             <a:pPr lvl="1"/>
             <a:r>
-              <a:rPr lang="en-CA" smtClean="0"/>
+              <a:rPr lang="en-CA"/>
               <a:t>Second level</a:t>
             </a:r>
           </a:p>
           <a:p>
             <a:pPr lvl="2"/>
             <a:r>
-              <a:rPr lang="en-CA" smtClean="0"/>
+              <a:rPr lang="en-CA"/>
               <a:t>Third level</a:t>
             </a:r>
           </a:p>
           <a:p>
             <a:pPr lvl="3"/>
             <a:r>
-              <a:rPr lang="en-CA" smtClean="0"/>
+              <a:rPr lang="en-CA"/>
               <a:t>Fourth level</a:t>
             </a:r>
           </a:p>
           <a:p>
             <a:pPr lvl="4"/>
             <a:r>
-              <a:rPr lang="en-CA" smtClean="0"/>
+              <a:rPr lang="en-CA"/>
               <a:t>Fifth level</a:t>
             </a:r>
             <a:endParaRPr lang="en-US"/>
@@ -638,7 +654,7 @@
           <a:p>
             <a:fld id="{779256A2-DE0C-7447-B687-786F38514E8C}" type="datetimeFigureOut">
               <a:rPr lang="en-US" smtClean="0"/>
-              <a:t>18-10-02</a:t>
+              <a:t>11/2/18</a:t>
             </a:fld>
             <a:endParaRPr lang="en-US"/>
           </a:p>
@@ -732,7 +748,7 @@
           <a:lstStyle/>
           <a:p>
             <a:r>
-              <a:rPr lang="en-CA" smtClean="0"/>
+              <a:rPr lang="en-CA"/>
               <a:t>Click to edit Master title style</a:t>
             </a:r>
             <a:endParaRPr lang="en-US"/>
@@ -756,35 +772,35 @@
           <a:p>
             <a:pPr lvl="0"/>
             <a:r>
-              <a:rPr lang="en-CA" smtClean="0"/>
+              <a:rPr lang="en-CA"/>
               <a:t>Click to edit Master text styles</a:t>
             </a:r>
           </a:p>
           <a:p>
             <a:pPr lvl="1"/>
             <a:r>
-              <a:rPr lang="en-CA" smtClean="0"/>
+              <a:rPr lang="en-CA"/>
               <a:t>Second level</a:t>
             </a:r>
           </a:p>
           <a:p>
             <a:pPr lvl="2"/>
             <a:r>
-              <a:rPr lang="en-CA" smtClean="0"/>
+              <a:rPr lang="en-CA"/>
               <a:t>Third level</a:t>
             </a:r>
           </a:p>
           <a:p>
             <a:pPr lvl="3"/>
             <a:r>
-              <a:rPr lang="en-CA" smtClean="0"/>
+              <a:rPr lang="en-CA"/>
               <a:t>Fourth level</a:t>
             </a:r>
           </a:p>
           <a:p>
             <a:pPr lvl="4"/>
             <a:r>
-              <a:rPr lang="en-CA" smtClean="0"/>
+              <a:rPr lang="en-CA"/>
               <a:t>Fifth level</a:t>
             </a:r>
             <a:endParaRPr lang="en-US"/>
@@ -808,7 +824,7 @@
           <a:p>
             <a:fld id="{779256A2-DE0C-7447-B687-786F38514E8C}" type="datetimeFigureOut">
               <a:rPr lang="en-US" smtClean="0"/>
-              <a:t>18-10-02</a:t>
+              <a:t>11/2/18</a:t>
             </a:fld>
             <a:endParaRPr lang="en-US"/>
           </a:p>
@@ -911,7 +927,7 @@
           </a:lstStyle>
           <a:p>
             <a:r>
-              <a:rPr lang="en-CA" smtClean="0"/>
+              <a:rPr lang="en-CA"/>
               <a:t>Click to edit Master title style</a:t>
             </a:r>
             <a:endParaRPr lang="en-US"/>
@@ -1031,7 +1047,7 @@
           <a:p>
             <a:pPr lvl="0"/>
             <a:r>
-              <a:rPr lang="en-CA" smtClean="0"/>
+              <a:rPr lang="en-CA"/>
               <a:t>Click to edit Master text styles</a:t>
             </a:r>
           </a:p>
@@ -1054,7 +1070,7 @@
           <a:p>
             <a:fld id="{779256A2-DE0C-7447-B687-786F38514E8C}" type="datetimeFigureOut">
               <a:rPr lang="en-US" smtClean="0"/>
-              <a:t>18-10-02</a:t>
+              <a:t>11/2/18</a:t>
             </a:fld>
             <a:endParaRPr lang="en-US"/>
           </a:p>
@@ -1148,7 +1164,7 @@
           <a:lstStyle/>
           <a:p>
             <a:r>
-              <a:rPr lang="en-CA" smtClean="0"/>
+              <a:rPr lang="en-CA"/>
               <a:t>Click to edit Master title style</a:t>
             </a:r>
             <a:endParaRPr lang="en-US"/>
@@ -1205,35 +1221,35 @@
           <a:p>
             <a:pPr lvl="0"/>
             <a:r>
-              <a:rPr lang="en-CA" smtClean="0"/>
+              <a:rPr lang="en-CA"/>
               <a:t>Click to edit Master text styles</a:t>
             </a:r>
           </a:p>
           <a:p>
             <a:pPr lvl="1"/>
             <a:r>
-              <a:rPr lang="en-CA" smtClean="0"/>
+              <a:rPr lang="en-CA"/>
               <a:t>Second level</a:t>
             </a:r>
           </a:p>
           <a:p>
             <a:pPr lvl="2"/>
             <a:r>
-              <a:rPr lang="en-CA" smtClean="0"/>
+              <a:rPr lang="en-CA"/>
               <a:t>Third level</a:t>
             </a:r>
           </a:p>
           <a:p>
             <a:pPr lvl="3"/>
             <a:r>
-              <a:rPr lang="en-CA" smtClean="0"/>
+              <a:rPr lang="en-CA"/>
               <a:t>Fourth level</a:t>
             </a:r>
           </a:p>
           <a:p>
             <a:pPr lvl="4"/>
             <a:r>
-              <a:rPr lang="en-CA" smtClean="0"/>
+              <a:rPr lang="en-CA"/>
               <a:t>Fifth level</a:t>
             </a:r>
             <a:endParaRPr lang="en-US"/>
@@ -1290,35 +1306,35 @@
           <a:p>
             <a:pPr lvl="0"/>
             <a:r>
-              <a:rPr lang="en-CA" smtClean="0"/>
+              <a:rPr lang="en-CA"/>
               <a:t>Click to edit Master text styles</a:t>
             </a:r>
           </a:p>
           <a:p>
             <a:pPr lvl="1"/>
             <a:r>
-              <a:rPr lang="en-CA" smtClean="0"/>
+              <a:rPr lang="en-CA"/>
               <a:t>Second level</a:t>
             </a:r>
           </a:p>
           <a:p>
             <a:pPr lvl="2"/>
             <a:r>
-              <a:rPr lang="en-CA" smtClean="0"/>
+              <a:rPr lang="en-CA"/>
               <a:t>Third level</a:t>
             </a:r>
           </a:p>
           <a:p>
             <a:pPr lvl="3"/>
             <a:r>
-              <a:rPr lang="en-CA" smtClean="0"/>
+              <a:rPr lang="en-CA"/>
               <a:t>Fourth level</a:t>
             </a:r>
           </a:p>
           <a:p>
             <a:pPr lvl="4"/>
             <a:r>
-              <a:rPr lang="en-CA" smtClean="0"/>
+              <a:rPr lang="en-CA"/>
               <a:t>Fifth level</a:t>
             </a:r>
             <a:endParaRPr lang="en-US"/>
@@ -1342,7 +1358,7 @@
           <a:p>
             <a:fld id="{779256A2-DE0C-7447-B687-786F38514E8C}" type="datetimeFigureOut">
               <a:rPr lang="en-US" smtClean="0"/>
-              <a:t>18-10-02</a:t>
+              <a:t>11/2/18</a:t>
             </a:fld>
             <a:endParaRPr lang="en-US"/>
           </a:p>
@@ -1440,7 +1456,7 @@
           </a:lstStyle>
           <a:p>
             <a:r>
-              <a:rPr lang="en-CA" smtClean="0"/>
+              <a:rPr lang="en-CA"/>
               <a:t>Click to edit Master title style</a:t>
             </a:r>
             <a:endParaRPr lang="en-US"/>
@@ -1506,7 +1522,7 @@
           <a:p>
             <a:pPr lvl="0"/>
             <a:r>
-              <a:rPr lang="en-CA" smtClean="0"/>
+              <a:rPr lang="en-CA"/>
               <a:t>Click to edit Master text styles</a:t>
             </a:r>
           </a:p>
@@ -1562,35 +1578,35 @@
           <a:p>
             <a:pPr lvl="0"/>
             <a:r>
-              <a:rPr lang="en-CA" smtClean="0"/>
+              <a:rPr lang="en-CA"/>
               <a:t>Click to edit Master text styles</a:t>
             </a:r>
           </a:p>
           <a:p>
             <a:pPr lvl="1"/>
             <a:r>
-              <a:rPr lang="en-CA" smtClean="0"/>
+              <a:rPr lang="en-CA"/>
               <a:t>Second level</a:t>
             </a:r>
           </a:p>
           <a:p>
             <a:pPr lvl="2"/>
             <a:r>
-              <a:rPr lang="en-CA" smtClean="0"/>
+              <a:rPr lang="en-CA"/>
               <a:t>Third level</a:t>
             </a:r>
           </a:p>
           <a:p>
             <a:pPr lvl="3"/>
             <a:r>
-              <a:rPr lang="en-CA" smtClean="0"/>
+              <a:rPr lang="en-CA"/>
               <a:t>Fourth level</a:t>
             </a:r>
           </a:p>
           <a:p>
             <a:pPr lvl="4"/>
             <a:r>
-              <a:rPr lang="en-CA" smtClean="0"/>
+              <a:rPr lang="en-CA"/>
               <a:t>Fifth level</a:t>
             </a:r>
             <a:endParaRPr lang="en-US"/>
@@ -1656,7 +1672,7 @@
           <a:p>
             <a:pPr lvl="0"/>
             <a:r>
-              <a:rPr lang="en-CA" smtClean="0"/>
+              <a:rPr lang="en-CA"/>
               <a:t>Click to edit Master text styles</a:t>
             </a:r>
           </a:p>
@@ -1712,35 +1728,35 @@
           <a:p>
             <a:pPr lvl="0"/>
             <a:r>
-              <a:rPr lang="en-CA" smtClean="0"/>
+              <a:rPr lang="en-CA"/>
               <a:t>Click to edit Master text styles</a:t>
             </a:r>
           </a:p>
           <a:p>
             <a:pPr lvl="1"/>
             <a:r>
-              <a:rPr lang="en-CA" smtClean="0"/>
+              <a:rPr lang="en-CA"/>
               <a:t>Second level</a:t>
             </a:r>
           </a:p>
           <a:p>
             <a:pPr lvl="2"/>
             <a:r>
-              <a:rPr lang="en-CA" smtClean="0"/>
+              <a:rPr lang="en-CA"/>
               <a:t>Third level</a:t>
             </a:r>
           </a:p>
           <a:p>
             <a:pPr lvl="3"/>
             <a:r>
-              <a:rPr lang="en-CA" smtClean="0"/>
+              <a:rPr lang="en-CA"/>
               <a:t>Fourth level</a:t>
             </a:r>
           </a:p>
           <a:p>
             <a:pPr lvl="4"/>
             <a:r>
-              <a:rPr lang="en-CA" smtClean="0"/>
+              <a:rPr lang="en-CA"/>
               <a:t>Fifth level</a:t>
             </a:r>
             <a:endParaRPr lang="en-US"/>
@@ -1764,7 +1780,7 @@
           <a:p>
             <a:fld id="{779256A2-DE0C-7447-B687-786F38514E8C}" type="datetimeFigureOut">
               <a:rPr lang="en-US" smtClean="0"/>
-              <a:t>18-10-02</a:t>
+              <a:t>11/2/18</a:t>
             </a:fld>
             <a:endParaRPr lang="en-US"/>
           </a:p>
@@ -1858,7 +1874,7 @@
           <a:lstStyle/>
           <a:p>
             <a:r>
-              <a:rPr lang="en-CA" smtClean="0"/>
+              <a:rPr lang="en-CA"/>
               <a:t>Click to edit Master title style</a:t>
             </a:r>
             <a:endParaRPr lang="en-US"/>
@@ -1882,7 +1898,7 @@
           <a:p>
             <a:fld id="{779256A2-DE0C-7447-B687-786F38514E8C}" type="datetimeFigureOut">
               <a:rPr lang="en-US" smtClean="0"/>
-              <a:t>18-10-02</a:t>
+              <a:t>11/2/18</a:t>
             </a:fld>
             <a:endParaRPr lang="en-US"/>
           </a:p>
@@ -1977,7 +1993,7 @@
           <a:p>
             <a:fld id="{779256A2-DE0C-7447-B687-786F38514E8C}" type="datetimeFigureOut">
               <a:rPr lang="en-US" smtClean="0"/>
-              <a:t>18-10-02</a:t>
+              <a:t>11/2/18</a:t>
             </a:fld>
             <a:endParaRPr lang="en-US"/>
           </a:p>
@@ -2080,7 +2096,7 @@
           </a:lstStyle>
           <a:p>
             <a:r>
-              <a:rPr lang="en-CA" smtClean="0"/>
+              <a:rPr lang="en-CA"/>
               <a:t>Click to edit Master title style</a:t>
             </a:r>
             <a:endParaRPr lang="en-US"/>
@@ -2137,35 +2153,35 @@
           <a:p>
             <a:pPr lvl="0"/>
             <a:r>
-              <a:rPr lang="en-CA" smtClean="0"/>
+              <a:rPr lang="en-CA"/>
               <a:t>Click to edit Master text styles</a:t>
             </a:r>
           </a:p>
           <a:p>
             <a:pPr lvl="1"/>
             <a:r>
-              <a:rPr lang="en-CA" smtClean="0"/>
+              <a:rPr lang="en-CA"/>
               <a:t>Second level</a:t>
             </a:r>
           </a:p>
           <a:p>
             <a:pPr lvl="2"/>
             <a:r>
-              <a:rPr lang="en-CA" smtClean="0"/>
+              <a:rPr lang="en-CA"/>
               <a:t>Third level</a:t>
             </a:r>
           </a:p>
           <a:p>
             <a:pPr lvl="3"/>
             <a:r>
-              <a:rPr lang="en-CA" smtClean="0"/>
+              <a:rPr lang="en-CA"/>
               <a:t>Fourth level</a:t>
             </a:r>
           </a:p>
           <a:p>
             <a:pPr lvl="4"/>
             <a:r>
-              <a:rPr lang="en-CA" smtClean="0"/>
+              <a:rPr lang="en-CA"/>
               <a:t>Fifth level</a:t>
             </a:r>
             <a:endParaRPr lang="en-US"/>
@@ -2231,7 +2247,7 @@
           <a:p>
             <a:pPr lvl="0"/>
             <a:r>
-              <a:rPr lang="en-CA" smtClean="0"/>
+              <a:rPr lang="en-CA"/>
               <a:t>Click to edit Master text styles</a:t>
             </a:r>
           </a:p>
@@ -2254,7 +2270,7 @@
           <a:p>
             <a:fld id="{779256A2-DE0C-7447-B687-786F38514E8C}" type="datetimeFigureOut">
               <a:rPr lang="en-US" smtClean="0"/>
-              <a:t>18-10-02</a:t>
+              <a:t>11/2/18</a:t>
             </a:fld>
             <a:endParaRPr lang="en-US"/>
           </a:p>
@@ -2357,7 +2373,7 @@
           </a:lstStyle>
           <a:p>
             <a:r>
-              <a:rPr lang="en-CA" smtClean="0"/>
+              <a:rPr lang="en-CA"/>
               <a:t>Click to edit Master title style</a:t>
             </a:r>
             <a:endParaRPr lang="en-US"/>
@@ -2484,7 +2500,7 @@
           <a:p>
             <a:pPr lvl="0"/>
             <a:r>
-              <a:rPr lang="en-CA" smtClean="0"/>
+              <a:rPr lang="en-CA"/>
               <a:t>Click to edit Master text styles</a:t>
             </a:r>
           </a:p>
@@ -2507,7 +2523,7 @@
           <a:p>
             <a:fld id="{779256A2-DE0C-7447-B687-786F38514E8C}" type="datetimeFigureOut">
               <a:rPr lang="en-US" smtClean="0"/>
-              <a:t>18-10-02</a:t>
+              <a:t>11/2/18</a:t>
             </a:fld>
             <a:endParaRPr lang="en-US"/>
           </a:p>
@@ -2616,7 +2632,7 @@
           <a:lstStyle/>
           <a:p>
             <a:r>
-              <a:rPr lang="en-CA" smtClean="0"/>
+              <a:rPr lang="en-CA"/>
               <a:t>Click to edit Master title style</a:t>
             </a:r>
             <a:endParaRPr lang="en-US"/>
@@ -2650,35 +2666,35 @@
           <a:p>
             <a:pPr lvl="0"/>
             <a:r>
-              <a:rPr lang="en-CA" smtClean="0"/>
+              <a:rPr lang="en-CA"/>
               <a:t>Click to edit Master text styles</a:t>
             </a:r>
           </a:p>
           <a:p>
             <a:pPr lvl="1"/>
             <a:r>
-              <a:rPr lang="en-CA" smtClean="0"/>
+              <a:rPr lang="en-CA"/>
               <a:t>Second level</a:t>
             </a:r>
           </a:p>
           <a:p>
             <a:pPr lvl="2"/>
             <a:r>
-              <a:rPr lang="en-CA" smtClean="0"/>
+              <a:rPr lang="en-CA"/>
               <a:t>Third level</a:t>
             </a:r>
           </a:p>
           <a:p>
             <a:pPr lvl="3"/>
             <a:r>
-              <a:rPr lang="en-CA" smtClean="0"/>
+              <a:rPr lang="en-CA"/>
               <a:t>Fourth level</a:t>
             </a:r>
           </a:p>
           <a:p>
             <a:pPr lvl="4"/>
             <a:r>
-              <a:rPr lang="en-CA" smtClean="0"/>
+              <a:rPr lang="en-CA"/>
               <a:t>Fifth level</a:t>
             </a:r>
             <a:endParaRPr lang="en-US"/>
@@ -2720,7 +2736,7 @@
           <a:p>
             <a:fld id="{779256A2-DE0C-7447-B687-786F38514E8C}" type="datetimeFigureOut">
               <a:rPr lang="en-US" smtClean="0"/>
-              <a:t>18-10-02</a:t>
+              <a:t>11/2/18</a:t>
             </a:fld>
             <a:endParaRPr lang="en-US"/>
           </a:p>
@@ -3104,9 +3120,9 @@
         <p:grpSpPr>
           <a:xfrm>
             <a:off x="189913" y="2053542"/>
-            <a:ext cx="8858711" cy="1246370"/>
+            <a:ext cx="8872935" cy="1666688"/>
             <a:chOff x="189913" y="1721177"/>
-            <a:chExt cx="8858711" cy="1246370"/>
+            <a:chExt cx="8872935" cy="1666688"/>
           </a:xfrm>
         </p:grpSpPr>
         <p:grpSp>
@@ -3118,9 +3134,9 @@
           <p:grpSpPr>
             <a:xfrm>
               <a:off x="189913" y="1721177"/>
-              <a:ext cx="1246302" cy="1246370"/>
+              <a:ext cx="1483694" cy="1666688"/>
               <a:chOff x="1436215" y="1721177"/>
-              <a:chExt cx="1246302" cy="1246370"/>
+              <a:chExt cx="1483694" cy="1666688"/>
             </a:xfrm>
           </p:grpSpPr>
           <p:sp>
@@ -3132,7 +3148,7 @@
             <p:spPr>
               <a:xfrm>
                 <a:off x="1436215" y="1721177"/>
-                <a:ext cx="1246302" cy="1246370"/>
+                <a:ext cx="1483694" cy="1666688"/>
               </a:xfrm>
               <a:prstGeom prst="ellipse">
                 <a:avLst/>
@@ -3176,8 +3192,8 @@
             </p:nvSpPr>
             <p:spPr>
               <a:xfrm>
-                <a:off x="1673605" y="2052185"/>
-                <a:ext cx="762949" cy="461665"/>
+                <a:off x="1530764" y="2052185"/>
+                <a:ext cx="1276310" cy="954107"/>
               </a:xfrm>
               <a:prstGeom prst="rect">
                 <a:avLst/>
@@ -3190,117 +3206,83 @@
               </a:bodyPr>
               <a:lstStyle/>
               <a:p>
+                <a:pPr algn="ctr"/>
                 <a:r>
-                  <a:rPr lang="en-US" sz="2400" dirty="0" smtClean="0">
+                  <a:rPr lang="en-US" sz="2400" dirty="0">
                     <a:latin typeface="Times New Roman"/>
                     <a:cs typeface="Times New Roman"/>
                   </a:rPr>
                   <a:t>User</a:t>
                 </a:r>
-                <a:endParaRPr lang="en-US" sz="2400" dirty="0">
-                  <a:latin typeface="Times New Roman"/>
-                  <a:cs typeface="Times New Roman"/>
-                </a:endParaRPr>
+              </a:p>
+              <a:p>
+                <a:pPr algn="ctr"/>
+                <a:r>
+                  <a:rPr lang="en-US" sz="1600" dirty="0">
+                    <a:latin typeface="Times New Roman"/>
+                    <a:cs typeface="Times New Roman"/>
+                  </a:rPr>
+                  <a:t>via </a:t>
+                </a:r>
+              </a:p>
+              <a:p>
+                <a:pPr algn="ctr"/>
+                <a:r>
+                  <a:rPr lang="en-US" sz="1600" dirty="0">
+                    <a:latin typeface="Times New Roman"/>
+                    <a:cs typeface="Times New Roman"/>
+                  </a:rPr>
+                  <a:t>user program</a:t>
+                </a:r>
               </a:p>
             </p:txBody>
           </p:sp>
         </p:grpSp>
-        <p:grpSp>
-          <p:nvGrpSpPr>
-            <p:cNvPr id="7" name="Group 6"/>
-            <p:cNvGrpSpPr/>
+        <p:sp>
+          <p:nvSpPr>
+            <p:cNvPr id="8" name="Oval 7"/>
+            <p:cNvSpPr/>
             <p:nvPr/>
-          </p:nvGrpSpPr>
-          <p:grpSpPr>
+          </p:nvSpPr>
+          <p:spPr>
             <a:xfrm>
-              <a:off x="7802322" y="1721177"/>
-              <a:ext cx="1246302" cy="1246370"/>
-              <a:chOff x="1436215" y="1721177"/>
-              <a:chExt cx="1246302" cy="1246370"/>
+              <a:off x="7579154" y="1721177"/>
+              <a:ext cx="1483694" cy="1666688"/>
             </a:xfrm>
-          </p:grpSpPr>
-          <p:sp>
-            <p:nvSpPr>
-              <p:cNvPr id="8" name="Oval 7"/>
-              <p:cNvSpPr/>
-              <p:nvPr/>
-            </p:nvSpPr>
-            <p:spPr>
-              <a:xfrm>
-                <a:off x="1436215" y="1721177"/>
-                <a:ext cx="1246302" cy="1246370"/>
-              </a:xfrm>
-              <a:prstGeom prst="ellipse">
-                <a:avLst/>
-              </a:prstGeom>
-              <a:noFill/>
-              <a:ln w="38100" cmpd="sng">
-                <a:solidFill>
-                  <a:schemeClr val="tx1"/>
-                </a:solidFill>
-              </a:ln>
-              <a:effectLst/>
-            </p:spPr>
-            <p:style>
-              <a:lnRef idx="1">
-                <a:schemeClr val="accent1"/>
-              </a:lnRef>
-              <a:fillRef idx="3">
-                <a:schemeClr val="accent1"/>
-              </a:fillRef>
-              <a:effectRef idx="2">
-                <a:schemeClr val="accent1"/>
-              </a:effectRef>
-              <a:fontRef idx="minor">
-                <a:schemeClr val="lt1"/>
-              </a:fontRef>
-            </p:style>
-            <p:txBody>
-              <a:bodyPr rtlCol="0" anchor="ctr"/>
-              <a:lstStyle/>
-              <a:p>
-                <a:pPr algn="ctr"/>
-                <a:endParaRPr lang="en-US"/>
-              </a:p>
-            </p:txBody>
-          </p:sp>
-          <p:sp>
-            <p:nvSpPr>
-              <p:cNvPr id="9" name="TextBox 8"/>
-              <p:cNvSpPr txBox="1"/>
-              <p:nvPr/>
-            </p:nvSpPr>
-            <p:spPr>
-              <a:xfrm>
-                <a:off x="1673605" y="2052185"/>
-                <a:ext cx="762949" cy="461665"/>
-              </a:xfrm>
-              <a:prstGeom prst="rect">
-                <a:avLst/>
-              </a:prstGeom>
-              <a:noFill/>
-            </p:spPr>
-            <p:txBody>
-              <a:bodyPr wrap="none" rtlCol="0">
-                <a:spAutoFit/>
-              </a:bodyPr>
-              <a:lstStyle/>
-              <a:p>
-                <a:r>
-                  <a:rPr lang="en-US" sz="2400" dirty="0" smtClean="0">
-                    <a:latin typeface="Times New Roman"/>
-                    <a:cs typeface="Times New Roman"/>
-                  </a:rPr>
-                  <a:t>User</a:t>
-                </a:r>
-                <a:endParaRPr lang="en-US" sz="2400" dirty="0">
-                  <a:latin typeface="Times New Roman"/>
-                  <a:cs typeface="Times New Roman"/>
-                </a:endParaRPr>
-              </a:p>
-            </p:txBody>
-          </p:sp>
-        </p:grpSp>
+            <a:prstGeom prst="ellipse">
+              <a:avLst/>
+            </a:prstGeom>
+            <a:noFill/>
+            <a:ln w="38100" cmpd="sng">
+              <a:solidFill>
+                <a:schemeClr val="tx1"/>
+              </a:solidFill>
+            </a:ln>
+            <a:effectLst/>
+          </p:spPr>
+          <p:style>
+            <a:lnRef idx="1">
+              <a:schemeClr val="accent1"/>
+            </a:lnRef>
+            <a:fillRef idx="3">
+              <a:schemeClr val="accent1"/>
+            </a:fillRef>
+            <a:effectRef idx="2">
+              <a:schemeClr val="accent1"/>
+            </a:effectRef>
+            <a:fontRef idx="minor">
+              <a:schemeClr val="lt1"/>
+            </a:fontRef>
+          </p:style>
+          <p:txBody>
+            <a:bodyPr rtlCol="0" anchor="ctr"/>
+            <a:lstStyle/>
+            <a:p>
+              <a:pPr algn="ctr"/>
+              <a:endParaRPr lang="en-US"/>
+            </a:p>
+          </p:txBody>
+        </p:sp>
       </p:grpSp>
       <p:grpSp>
         <p:nvGrpSpPr>
@@ -3310,8 +3292,8 @@
         </p:nvGrpSpPr>
         <p:grpSpPr>
           <a:xfrm>
-            <a:off x="3885481" y="2053542"/>
-            <a:ext cx="1483694" cy="1246370"/>
+            <a:off x="3885481" y="2078594"/>
+            <a:ext cx="1483694" cy="1754370"/>
             <a:chOff x="3703297" y="1721177"/>
             <a:chExt cx="1483694" cy="1246370"/>
           </a:xfrm>
@@ -3388,19 +3370,8 @@
                   <a:latin typeface="Times New Roman"/>
                   <a:cs typeface="Times New Roman"/>
                 </a:rPr>
-                <a:t>C</a:t>
+                <a:t>CFS</a:t>
               </a:r>
-              <a:r>
-                <a:rPr lang="en-US" sz="2400" dirty="0" smtClean="0">
-                  <a:latin typeface="Times New Roman"/>
-                  <a:cs typeface="Times New Roman"/>
-                </a:rPr>
-                <a:t>FS</a:t>
-              </a:r>
-              <a:endParaRPr lang="en-US" sz="2400" dirty="0">
-                <a:latin typeface="Times New Roman"/>
-                <a:cs typeface="Times New Roman"/>
-              </a:endParaRPr>
             </a:p>
           </p:txBody>
         </p:sp>
@@ -3409,15 +3380,15 @@
         <p:nvCxnSpPr>
           <p:cNvPr id="25" name="Straight Arrow Connector 24"/>
           <p:cNvCxnSpPr>
-            <a:stCxn id="4" idx="6"/>
+            <a:cxnSpLocks/>
             <a:endCxn id="18" idx="1"/>
           </p:cNvCxnSpPr>
           <p:nvPr/>
         </p:nvCxnSpPr>
         <p:spPr>
           <a:xfrm>
-            <a:off x="1436215" y="2676727"/>
-            <a:ext cx="2449266" cy="0"/>
+            <a:off x="1673607" y="2924464"/>
+            <a:ext cx="2211874" cy="31315"/>
           </a:xfrm>
           <a:prstGeom prst="straightConnector1">
             <a:avLst/>
@@ -3448,13 +3419,15 @@
       <p:cxnSp>
         <p:nvCxnSpPr>
           <p:cNvPr id="27" name="Straight Arrow Connector 26"/>
-          <p:cNvCxnSpPr/>
+          <p:cNvCxnSpPr>
+            <a:cxnSpLocks/>
+          </p:cNvCxnSpPr>
           <p:nvPr/>
         </p:nvCxnSpPr>
         <p:spPr>
           <a:xfrm>
-            <a:off x="5369175" y="2676727"/>
-            <a:ext cx="2449266" cy="0"/>
+            <a:off x="5369175" y="2952300"/>
+            <a:ext cx="2209979" cy="3479"/>
           </a:xfrm>
           <a:prstGeom prst="straightConnector1">
             <a:avLst/>
@@ -3505,44 +3478,12 @@
           <a:lstStyle/>
           <a:p>
             <a:r>
-              <a:rPr lang="en-US" sz="2400" dirty="0" smtClean="0">
-                <a:latin typeface="Times New Roman"/>
-                <a:cs typeface="Times New Roman"/>
-              </a:rPr>
-              <a:t>Curve </a:t>
-            </a:r>
-            <a:r>
               <a:rPr lang="en-US" sz="2400" dirty="0">
                 <a:latin typeface="Times New Roman"/>
                 <a:cs typeface="Times New Roman"/>
               </a:rPr>
-              <a:t>F</a:t>
-            </a:r>
-            <a:r>
-              <a:rPr lang="en-US" sz="2400" dirty="0" smtClean="0">
-                <a:latin typeface="Times New Roman"/>
-                <a:cs typeface="Times New Roman"/>
-              </a:rPr>
-              <a:t>itting </a:t>
-            </a:r>
-            <a:r>
-              <a:rPr lang="en-US" sz="2400" dirty="0">
-                <a:latin typeface="Times New Roman"/>
-                <a:cs typeface="Times New Roman"/>
-              </a:rPr>
-              <a:t>S</a:t>
-            </a:r>
-            <a:r>
-              <a:rPr lang="en-US" sz="2400" dirty="0" smtClean="0">
-                <a:latin typeface="Times New Roman"/>
-                <a:cs typeface="Times New Roman"/>
-              </a:rPr>
-              <a:t>oftware</a:t>
-            </a:r>
-            <a:endParaRPr lang="en-US" sz="2400" dirty="0">
-              <a:latin typeface="Times New Roman"/>
-              <a:cs typeface="Times New Roman"/>
-            </a:endParaRPr>
+              <a:t>Curve Fitting Software</a:t>
+            </a:r>
           </a:p>
         </p:txBody>
       </p:sp>
@@ -3554,8 +3495,8 @@
         </p:nvSpPr>
         <p:spPr>
           <a:xfrm>
-            <a:off x="1438236" y="2268572"/>
-            <a:ext cx="2441694" cy="369332"/>
+            <a:off x="1538444" y="2268572"/>
+            <a:ext cx="2300630" cy="369332"/>
           </a:xfrm>
           <a:prstGeom prst="rect">
             <a:avLst/>
@@ -3569,16 +3510,12 @@
           <a:lstStyle/>
           <a:p>
             <a:r>
-              <a:rPr lang="en-US" dirty="0" smtClean="0">
+              <a:rPr lang="en-US" dirty="0">
                 <a:latin typeface="Times New Roman"/>
                 <a:cs typeface="Times New Roman"/>
               </a:rPr>
-              <a:t>Data, choice of software</a:t>
-            </a:r>
-            <a:endParaRPr lang="en-US" dirty="0">
-              <a:latin typeface="Times New Roman"/>
-              <a:cs typeface="Times New Roman"/>
-            </a:endParaRPr>
+              <a:t>Data, choice of service</a:t>
+            </a:r>
           </a:p>
         </p:txBody>
       </p:sp>
@@ -3590,7 +3527,7 @@
         </p:nvSpPr>
         <p:spPr>
           <a:xfrm>
-            <a:off x="5510124" y="2243422"/>
+            <a:off x="5510124" y="2343630"/>
             <a:ext cx="1928082" cy="369332"/>
           </a:xfrm>
           <a:prstGeom prst="rect">
@@ -3605,16 +3542,71 @@
           <a:lstStyle/>
           <a:p>
             <a:r>
-              <a:rPr lang="en-US" dirty="0" smtClean="0">
+              <a:rPr lang="en-US" dirty="0">
                 <a:latin typeface="Times New Roman"/>
                 <a:cs typeface="Times New Roman"/>
               </a:rPr>
               <a:t>Best fit parameters</a:t>
             </a:r>
-            <a:endParaRPr lang="en-US" dirty="0">
-              <a:latin typeface="Times New Roman"/>
-              <a:cs typeface="Times New Roman"/>
-            </a:endParaRPr>
+          </a:p>
+        </p:txBody>
+      </p:sp>
+      <p:sp>
+        <p:nvSpPr>
+          <p:cNvPr id="26" name="TextBox 25">
+            <a:extLst>
+              <a:ext uri="{FF2B5EF4-FFF2-40B4-BE49-F238E27FC236}">
+                <a16:creationId xmlns:a16="http://schemas.microsoft.com/office/drawing/2014/main" id="{85769CAB-1E29-2148-AB6B-806D6E5B7778}"/>
+              </a:ext>
+            </a:extLst>
+          </p:cNvPr>
+          <p:cNvSpPr txBox="1"/>
+          <p:nvPr/>
+        </p:nvSpPr>
+        <p:spPr>
+          <a:xfrm>
+            <a:off x="7693238" y="2474893"/>
+            <a:ext cx="1276310" cy="954107"/>
+          </a:xfrm>
+          <a:prstGeom prst="rect">
+            <a:avLst/>
+          </a:prstGeom>
+          <a:noFill/>
+        </p:spPr>
+        <p:txBody>
+          <a:bodyPr wrap="none" rtlCol="0">
+            <a:spAutoFit/>
+          </a:bodyPr>
+          <a:lstStyle/>
+          <a:p>
+            <a:pPr algn="ctr"/>
+            <a:r>
+              <a:rPr lang="en-US" sz="2400" dirty="0">
+                <a:latin typeface="Times New Roman"/>
+                <a:cs typeface="Times New Roman"/>
+              </a:rPr>
+              <a:t>User</a:t>
+            </a:r>
+          </a:p>
+          <a:p>
+            <a:pPr algn="ctr"/>
+            <a:r>
+              <a:rPr lang="en-US" sz="1600" dirty="0">
+                <a:latin typeface="Times New Roman"/>
+                <a:cs typeface="Times New Roman"/>
+              </a:rPr>
+              <a:t>via </a:t>
+            </a:r>
+          </a:p>
+          <a:p>
+            <a:pPr algn="ctr"/>
+            <a:r>
+              <a:rPr lang="en-US" sz="1600" dirty="0">
+                <a:latin typeface="Times New Roman"/>
+                <a:cs typeface="Times New Roman"/>
+              </a:rPr>
+              <a:t>user program</a:t>
+            </a:r>
           </a:p>
         </p:txBody>
       </p:sp>

</xml_diff>